<commit_message>
updated Tags and Versioning and fixed typo in Table of Scenarios
</commit_message>
<xml_diff>
--- a/Tags and Versioning.pptx
+++ b/Tags and Versioning.pptx
@@ -8,6 +8,8 @@
     <p:sldId id="256" r:id="rId2"/>
     <p:sldId id="257" r:id="rId3"/>
     <p:sldId id="258" r:id="rId4"/>
+    <p:sldId id="260" r:id="rId5"/>
+    <p:sldId id="259" r:id="rId6"/>
   </p:sldIdLst>
   <p:sldSz cx="9144000" cy="6858000" type="screen4x3"/>
   <p:notesSz cx="6858000" cy="9144000"/>
@@ -3317,46 +3319,6 @@
       </p:sp>
       <p:sp>
         <p:nvSpPr>
-          <p:cNvPr id="4" name="Rectangle 3"/>
-          <p:cNvSpPr/>
-          <p:nvPr/>
-        </p:nvSpPr>
-        <p:spPr>
-          <a:xfrm>
-            <a:off x="539552" y="2708920"/>
-            <a:ext cx="6840760" cy="504056"/>
-          </a:xfrm>
-          <a:prstGeom prst="rect">
-            <a:avLst/>
-          </a:prstGeom>
-        </p:spPr>
-        <p:style>
-          <a:lnRef idx="2">
-            <a:schemeClr val="dk1">
-              <a:shade val="50000"/>
-            </a:schemeClr>
-          </a:lnRef>
-          <a:fillRef idx="1">
-            <a:schemeClr val="dk1"/>
-          </a:fillRef>
-          <a:effectRef idx="0">
-            <a:schemeClr val="dk1"/>
-          </a:effectRef>
-          <a:fontRef idx="minor">
-            <a:schemeClr val="lt1"/>
-          </a:fontRef>
-        </p:style>
-        <p:txBody>
-          <a:bodyPr rtlCol="0" anchor="ctr"/>
-          <a:lstStyle/>
-          <a:p>
-            <a:pPr algn="ctr"/>
-            <a:endParaRPr lang="en-SG" dirty="0"/>
-          </a:p>
-        </p:txBody>
-      </p:sp>
-      <p:sp>
-        <p:nvSpPr>
           <p:cNvPr id="3" name="Content Placeholder 2"/>
           <p:cNvSpPr>
             <a:spLocks noGrp="1"/>
@@ -3395,81 +3357,139 @@
             <a:pPr marL="0" indent="0">
               <a:buNone/>
             </a:pPr>
-            <a:r>
-              <a:rPr lang="en-US" dirty="0" err="1">
+            <a:endParaRPr lang="en-US" dirty="0" smtClean="0"/>
+          </a:p>
+          <a:p>
+            <a:pPr marL="0" indent="0">
+              <a:buNone/>
+            </a:pPr>
+            <a:r>
+              <a:rPr lang="en-US" dirty="0" smtClean="0"/>
+              <a:t>Replace </a:t>
+            </a:r>
+            <a:r>
+              <a:rPr lang="en-US" dirty="0" smtClean="0"/>
+              <a:t>the &lt;tag name&gt; with a tag name of your choice (usually a version number) and </a:t>
+            </a:r>
+            <a:r>
+              <a:rPr lang="en-US" dirty="0"/>
+              <a:t>&lt;your message&gt; </a:t>
+            </a:r>
+            <a:r>
+              <a:rPr lang="en-US" dirty="0" smtClean="0"/>
+              <a:t>with a message reminding you what the tag was for.</a:t>
+            </a:r>
+          </a:p>
+          <a:p>
+            <a:pPr marL="0" indent="0">
+              <a:buNone/>
+            </a:pPr>
+            <a:r>
+              <a:rPr lang="en-US" dirty="0" smtClean="0"/>
+              <a:t>This command will tag the last commit you made.</a:t>
+            </a:r>
+            <a:endParaRPr lang="en-SG" dirty="0"/>
+          </a:p>
+        </p:txBody>
+      </p:sp>
+      <p:sp>
+        <p:nvSpPr>
+          <p:cNvPr id="5" name="Rectangle 4"/>
+          <p:cNvSpPr/>
+          <p:nvPr/>
+        </p:nvSpPr>
+        <p:spPr>
+          <a:xfrm flipH="1">
+            <a:off x="827584" y="2780928"/>
+            <a:ext cx="5184576" cy="360040"/>
+          </a:xfrm>
+          <a:prstGeom prst="rect">
+            <a:avLst/>
+          </a:prstGeom>
+          <a:solidFill>
+            <a:schemeClr val="tx1"/>
+          </a:solidFill>
+          <a:ln>
+            <a:noFill/>
+          </a:ln>
+        </p:spPr>
+        <p:style>
+          <a:lnRef idx="2">
+            <a:schemeClr val="accent1">
+              <a:shade val="50000"/>
+            </a:schemeClr>
+          </a:lnRef>
+          <a:fillRef idx="1">
+            <a:schemeClr val="accent1"/>
+          </a:fillRef>
+          <a:effectRef idx="0">
+            <a:schemeClr val="accent1"/>
+          </a:effectRef>
+          <a:fontRef idx="minor">
+            <a:schemeClr val="lt1"/>
+          </a:fontRef>
+        </p:style>
+        <p:txBody>
+          <a:bodyPr rtlCol="0" anchor="ctr"/>
+          <a:lstStyle/>
+          <a:p>
+            <a:r>
+              <a:rPr lang="en-US" b="1" dirty="0" err="1" smtClean="0">
                 <a:solidFill>
-                  <a:srgbClr val="00B050"/>
+                  <a:srgbClr val="92D050"/>
                 </a:solidFill>
+                <a:latin typeface="Arial" pitchFamily="34" charset="0"/>
+                <a:cs typeface="Arial" pitchFamily="34" charset="0"/>
               </a:rPr>
               <a:t>git</a:t>
             </a:r>
             <a:r>
-              <a:rPr lang="en-US" dirty="0">
+              <a:rPr lang="en-US" b="1" dirty="0" smtClean="0">
                 <a:solidFill>
-                  <a:srgbClr val="00B050"/>
+                  <a:srgbClr val="92D050"/>
                 </a:solidFill>
+                <a:latin typeface="Arial" pitchFamily="34" charset="0"/>
+                <a:cs typeface="Arial" pitchFamily="34" charset="0"/>
               </a:rPr>
-              <a:t> tag -a </a:t>
-            </a:r>
-            <a:r>
-              <a:rPr lang="en-US" dirty="0">
+              <a:t>  tag  -a  </a:t>
+            </a:r>
+            <a:r>
+              <a:rPr lang="en-US" b="1" dirty="0" smtClean="0">
                 <a:solidFill>
                   <a:schemeClr val="bg1"/>
                 </a:solidFill>
+                <a:latin typeface="Arial" pitchFamily="34" charset="0"/>
+                <a:cs typeface="Arial" pitchFamily="34" charset="0"/>
               </a:rPr>
               <a:t>&lt;tag name&gt;</a:t>
             </a:r>
             <a:r>
-              <a:rPr lang="en-US" dirty="0">
+              <a:rPr lang="en-US" b="1" dirty="0" smtClean="0">
                 <a:solidFill>
-                  <a:srgbClr val="00B050"/>
+                  <a:srgbClr val="92D050"/>
                 </a:solidFill>
+                <a:latin typeface="Arial" pitchFamily="34" charset="0"/>
+                <a:cs typeface="Arial" pitchFamily="34" charset="0"/>
               </a:rPr>
-              <a:t> -m </a:t>
-            </a:r>
-            <a:r>
-              <a:rPr lang="en-US" dirty="0">
+              <a:t>  -m  </a:t>
+            </a:r>
+            <a:r>
+              <a:rPr lang="en-US" b="1" dirty="0" smtClean="0">
                 <a:solidFill>
                   <a:schemeClr val="bg1"/>
                 </a:solidFill>
+                <a:latin typeface="Arial" pitchFamily="34" charset="0"/>
+                <a:cs typeface="Arial" pitchFamily="34" charset="0"/>
               </a:rPr>
-              <a:t>&lt;your message</a:t>
-            </a:r>
-            <a:r>
-              <a:rPr lang="en-US" dirty="0" smtClean="0">
-                <a:solidFill>
-                  <a:schemeClr val="bg1"/>
-                </a:solidFill>
-              </a:rPr>
-              <a:t>&gt;</a:t>
-            </a:r>
-          </a:p>
-          <a:p>
-            <a:pPr marL="0" indent="0">
-              <a:buNone/>
-            </a:pPr>
-            <a:r>
-              <a:rPr lang="en-US" dirty="0" smtClean="0"/>
-              <a:t>Replace the &lt;tag name&gt; with a tag name of your choice (usually a version number) and </a:t>
-            </a:r>
-            <a:r>
-              <a:rPr lang="en-US" dirty="0"/>
-              <a:t>&lt;your message&gt; </a:t>
-            </a:r>
-            <a:r>
-              <a:rPr lang="en-US" dirty="0" smtClean="0"/>
-              <a:t>with a message reminding you what the tag was for.</a:t>
-            </a:r>
-          </a:p>
-          <a:p>
-            <a:pPr marL="0" indent="0">
-              <a:buNone/>
-            </a:pPr>
-            <a:r>
-              <a:rPr lang="en-US" dirty="0" smtClean="0"/>
-              <a:t>This command will tag the last commit you made.</a:t>
-            </a:r>
-            <a:endParaRPr lang="en-SG" dirty="0"/>
+              <a:t>&lt;your message&gt;</a:t>
+            </a:r>
+            <a:endParaRPr lang="en-US" b="1" dirty="0">
+              <a:solidFill>
+                <a:schemeClr val="bg1"/>
+              </a:solidFill>
+              <a:latin typeface="Arial" pitchFamily="34" charset="0"/>
+              <a:cs typeface="Arial" pitchFamily="34" charset="0"/>
+            </a:endParaRPr>
           </a:p>
         </p:txBody>
       </p:sp>
@@ -3477,6 +3497,642 @@
     <p:extLst>
       <p:ext uri="{BB962C8B-B14F-4D97-AF65-F5344CB8AC3E}">
         <p14:creationId xmlns:p14="http://schemas.microsoft.com/office/powerpoint/2010/main" val="1409658802"/>
+      </p:ext>
+    </p:extLst>
+  </p:cSld>
+  <p:clrMapOvr>
+    <a:masterClrMapping/>
+  </p:clrMapOvr>
+  <p:timing>
+    <p:tnLst>
+      <p:par>
+        <p:cTn id="1" dur="indefinite" restart="never" nodeType="tmRoot"/>
+      </p:par>
+    </p:tnLst>
+  </p:timing>
+</p:sld>
+</file>
+
+<file path=ppt/slides/slide4.xml><?xml version="1.0" encoding="utf-8"?>
+<p:sld xmlns:a="http://schemas.openxmlformats.org/drawingml/2006/main" xmlns:r="http://schemas.openxmlformats.org/officeDocument/2006/relationships" xmlns:p="http://schemas.openxmlformats.org/presentationml/2006/main">
+  <p:cSld>
+    <p:spTree>
+      <p:nvGrpSpPr>
+        <p:cNvPr id="1" name=""/>
+        <p:cNvGrpSpPr/>
+        <p:nvPr/>
+      </p:nvGrpSpPr>
+      <p:grpSpPr>
+        <a:xfrm>
+          <a:off x="0" y="0"/>
+          <a:ext cx="0" cy="0"/>
+          <a:chOff x="0" y="0"/>
+          <a:chExt cx="0" cy="0"/>
+        </a:xfrm>
+      </p:grpSpPr>
+      <p:sp>
+        <p:nvSpPr>
+          <p:cNvPr id="2" name="Title 1"/>
+          <p:cNvSpPr>
+            <a:spLocks noGrp="1"/>
+          </p:cNvSpPr>
+          <p:nvPr>
+            <p:ph type="title"/>
+          </p:nvPr>
+        </p:nvSpPr>
+        <p:spPr/>
+        <p:txBody>
+          <a:bodyPr/>
+          <a:lstStyle/>
+          <a:p>
+            <a:r>
+              <a:rPr lang="en-US" dirty="0" smtClean="0"/>
+              <a:t>Tags</a:t>
+            </a:r>
+            <a:endParaRPr lang="en-SG" dirty="0"/>
+          </a:p>
+        </p:txBody>
+      </p:sp>
+      <p:sp>
+        <p:nvSpPr>
+          <p:cNvPr id="3" name="Content Placeholder 2"/>
+          <p:cNvSpPr>
+            <a:spLocks noGrp="1"/>
+          </p:cNvSpPr>
+          <p:nvPr>
+            <p:ph idx="1"/>
+          </p:nvPr>
+        </p:nvSpPr>
+        <p:spPr/>
+        <p:txBody>
+          <a:bodyPr/>
+          <a:lstStyle/>
+          <a:p>
+            <a:pPr marL="0" indent="0">
+              <a:buNone/>
+            </a:pPr>
+            <a:r>
+              <a:rPr lang="en-US" dirty="0" smtClean="0"/>
+              <a:t>You can also tag a specific commit with this:</a:t>
+            </a:r>
+          </a:p>
+          <a:p>
+            <a:pPr marL="0" indent="0">
+              <a:buNone/>
+            </a:pPr>
+            <a:endParaRPr lang="en-US" dirty="0"/>
+          </a:p>
+          <a:p>
+            <a:pPr marL="0" indent="0">
+              <a:buNone/>
+            </a:pPr>
+            <a:r>
+              <a:rPr lang="en-US" dirty="0" smtClean="0"/>
+              <a:t>Just make sure you have find the right commit you wish to tag, and take note of it's checksum.</a:t>
+            </a:r>
+          </a:p>
+          <a:p>
+            <a:pPr marL="0" indent="0">
+              <a:buNone/>
+            </a:pPr>
+            <a:endParaRPr lang="en-SG" dirty="0"/>
+          </a:p>
+        </p:txBody>
+      </p:sp>
+      <p:sp>
+        <p:nvSpPr>
+          <p:cNvPr id="4" name="Rectangle 3"/>
+          <p:cNvSpPr/>
+          <p:nvPr/>
+        </p:nvSpPr>
+        <p:spPr>
+          <a:xfrm flipH="1">
+            <a:off x="799519" y="2276872"/>
+            <a:ext cx="6552728" cy="360040"/>
+          </a:xfrm>
+          <a:prstGeom prst="rect">
+            <a:avLst/>
+          </a:prstGeom>
+          <a:solidFill>
+            <a:schemeClr val="tx1"/>
+          </a:solidFill>
+          <a:ln>
+            <a:noFill/>
+          </a:ln>
+        </p:spPr>
+        <p:style>
+          <a:lnRef idx="2">
+            <a:schemeClr val="accent1">
+              <a:shade val="50000"/>
+            </a:schemeClr>
+          </a:lnRef>
+          <a:fillRef idx="1">
+            <a:schemeClr val="accent1"/>
+          </a:fillRef>
+          <a:effectRef idx="0">
+            <a:schemeClr val="accent1"/>
+          </a:effectRef>
+          <a:fontRef idx="minor">
+            <a:schemeClr val="lt1"/>
+          </a:fontRef>
+        </p:style>
+        <p:txBody>
+          <a:bodyPr rtlCol="0" anchor="ctr"/>
+          <a:lstStyle/>
+          <a:p>
+            <a:r>
+              <a:rPr lang="en-US" b="1" dirty="0" err="1" smtClean="0">
+                <a:solidFill>
+                  <a:srgbClr val="92D050"/>
+                </a:solidFill>
+                <a:latin typeface="Arial" pitchFamily="34" charset="0"/>
+                <a:cs typeface="Arial" pitchFamily="34" charset="0"/>
+              </a:rPr>
+              <a:t>git</a:t>
+            </a:r>
+            <a:r>
+              <a:rPr lang="en-US" b="1" dirty="0" smtClean="0">
+                <a:solidFill>
+                  <a:srgbClr val="92D050"/>
+                </a:solidFill>
+                <a:latin typeface="Arial" pitchFamily="34" charset="0"/>
+                <a:cs typeface="Arial" pitchFamily="34" charset="0"/>
+              </a:rPr>
+              <a:t>  tag  -a  </a:t>
+            </a:r>
+            <a:r>
+              <a:rPr lang="en-US" b="1" dirty="0" smtClean="0">
+                <a:solidFill>
+                  <a:schemeClr val="bg1"/>
+                </a:solidFill>
+                <a:latin typeface="Arial" pitchFamily="34" charset="0"/>
+                <a:cs typeface="Arial" pitchFamily="34" charset="0"/>
+              </a:rPr>
+              <a:t>&lt;tag name&gt; </a:t>
+            </a:r>
+            <a:r>
+              <a:rPr lang="en-US" b="1" dirty="0" smtClean="0">
+                <a:solidFill>
+                  <a:srgbClr val="92D050"/>
+                </a:solidFill>
+                <a:latin typeface="Arial" pitchFamily="34" charset="0"/>
+                <a:cs typeface="Arial" pitchFamily="34" charset="0"/>
+              </a:rPr>
+              <a:t>-m  </a:t>
+            </a:r>
+            <a:r>
+              <a:rPr lang="en-US" b="1" dirty="0" smtClean="0">
+                <a:solidFill>
+                  <a:schemeClr val="bg1"/>
+                </a:solidFill>
+                <a:latin typeface="Arial" pitchFamily="34" charset="0"/>
+                <a:cs typeface="Arial" pitchFamily="34" charset="0"/>
+              </a:rPr>
+              <a:t>&lt;your message&gt; </a:t>
+            </a:r>
+            <a:r>
+              <a:rPr lang="en-US" b="1" dirty="0">
+                <a:solidFill>
+                  <a:schemeClr val="bg1"/>
+                </a:solidFill>
+                <a:latin typeface="Arial" pitchFamily="34" charset="0"/>
+                <a:cs typeface="Arial" pitchFamily="34" charset="0"/>
+              </a:rPr>
+              <a:t>&lt;checksum&gt;</a:t>
+            </a:r>
+          </a:p>
+        </p:txBody>
+      </p:sp>
+    </p:spTree>
+    <p:extLst>
+      <p:ext uri="{BB962C8B-B14F-4D97-AF65-F5344CB8AC3E}">
+        <p14:creationId xmlns:p14="http://schemas.microsoft.com/office/powerpoint/2010/main" val="2252160868"/>
+      </p:ext>
+    </p:extLst>
+  </p:cSld>
+  <p:clrMapOvr>
+    <a:masterClrMapping/>
+  </p:clrMapOvr>
+  <p:timing>
+    <p:tnLst>
+      <p:par>
+        <p:cTn id="1" dur="indefinite" restart="never" nodeType="tmRoot"/>
+      </p:par>
+    </p:tnLst>
+  </p:timing>
+</p:sld>
+</file>
+
+<file path=ppt/slides/slide5.xml><?xml version="1.0" encoding="utf-8"?>
+<p:sld xmlns:a="http://schemas.openxmlformats.org/drawingml/2006/main" xmlns:r="http://schemas.openxmlformats.org/officeDocument/2006/relationships" xmlns:p="http://schemas.openxmlformats.org/presentationml/2006/main">
+  <p:cSld>
+    <p:spTree>
+      <p:nvGrpSpPr>
+        <p:cNvPr id="1" name=""/>
+        <p:cNvGrpSpPr/>
+        <p:nvPr/>
+      </p:nvGrpSpPr>
+      <p:grpSpPr>
+        <a:xfrm>
+          <a:off x="0" y="0"/>
+          <a:ext cx="0" cy="0"/>
+          <a:chOff x="0" y="0"/>
+          <a:chExt cx="0" cy="0"/>
+        </a:xfrm>
+      </p:grpSpPr>
+      <p:sp>
+        <p:nvSpPr>
+          <p:cNvPr id="2" name="Title 1"/>
+          <p:cNvSpPr>
+            <a:spLocks noGrp="1"/>
+          </p:cNvSpPr>
+          <p:nvPr>
+            <p:ph type="title"/>
+          </p:nvPr>
+        </p:nvSpPr>
+        <p:spPr/>
+        <p:txBody>
+          <a:bodyPr/>
+          <a:lstStyle/>
+          <a:p>
+            <a:r>
+              <a:rPr lang="en-US" dirty="0" smtClean="0"/>
+              <a:t>Tags</a:t>
+            </a:r>
+            <a:endParaRPr lang="en-SG" dirty="0"/>
+          </a:p>
+        </p:txBody>
+      </p:sp>
+      <p:sp>
+        <p:nvSpPr>
+          <p:cNvPr id="3" name="Content Placeholder 2"/>
+          <p:cNvSpPr>
+            <a:spLocks noGrp="1"/>
+          </p:cNvSpPr>
+          <p:nvPr>
+            <p:ph idx="1"/>
+          </p:nvPr>
+        </p:nvSpPr>
+        <p:spPr>
+          <a:xfrm>
+            <a:off x="457200" y="1600200"/>
+            <a:ext cx="8229600" cy="4925144"/>
+          </a:xfrm>
+        </p:spPr>
+        <p:txBody>
+          <a:bodyPr/>
+          <a:lstStyle/>
+          <a:p>
+            <a:pPr marL="0" indent="0">
+              <a:buNone/>
+            </a:pPr>
+            <a:r>
+              <a:rPr lang="en-US" dirty="0" smtClean="0"/>
+              <a:t>If you want to view the tags that you've created for your project, type:</a:t>
+            </a:r>
+          </a:p>
+          <a:p>
+            <a:pPr marL="0" indent="0">
+              <a:buNone/>
+            </a:pPr>
+            <a:r>
+              <a:rPr lang="en-US" dirty="0" smtClean="0"/>
+              <a:t>		or 	</a:t>
+            </a:r>
+          </a:p>
+          <a:p>
+            <a:pPr marL="0" indent="0">
+              <a:buNone/>
+            </a:pPr>
+            <a:r>
+              <a:rPr lang="en-US" dirty="0" smtClean="0"/>
+              <a:t>The first </a:t>
+            </a:r>
+            <a:r>
+              <a:rPr lang="en-US" dirty="0"/>
+              <a:t>command </a:t>
+            </a:r>
+            <a:r>
+              <a:rPr lang="en-US" dirty="0" smtClean="0"/>
+              <a:t>will list all your tags, while the second </a:t>
+            </a:r>
+            <a:r>
+              <a:rPr lang="en-US" dirty="0"/>
+              <a:t>one </a:t>
+            </a:r>
+            <a:r>
+              <a:rPr lang="en-US" dirty="0" smtClean="0"/>
+              <a:t>will filter out the tags you have, based on a criteria you give it. For example, </a:t>
+            </a:r>
+            <a:br>
+              <a:rPr lang="en-US" dirty="0" smtClean="0"/>
+            </a:br>
+            <a:r>
+              <a:rPr lang="en-US" dirty="0" smtClean="0"/>
+              <a:t>		will find all the tags starting with "a". Similarly, 			will find everything ending in a "c".</a:t>
+            </a:r>
+            <a:endParaRPr lang="en-SG" dirty="0"/>
+          </a:p>
+        </p:txBody>
+      </p:sp>
+      <p:sp>
+        <p:nvSpPr>
+          <p:cNvPr id="4" name="Rectangle 3"/>
+          <p:cNvSpPr/>
+          <p:nvPr/>
+        </p:nvSpPr>
+        <p:spPr>
+          <a:xfrm flipH="1">
+            <a:off x="827584" y="2780928"/>
+            <a:ext cx="1008112" cy="360040"/>
+          </a:xfrm>
+          <a:prstGeom prst="rect">
+            <a:avLst/>
+          </a:prstGeom>
+          <a:solidFill>
+            <a:schemeClr val="tx1"/>
+          </a:solidFill>
+          <a:ln>
+            <a:noFill/>
+          </a:ln>
+        </p:spPr>
+        <p:style>
+          <a:lnRef idx="2">
+            <a:schemeClr val="accent1">
+              <a:shade val="50000"/>
+            </a:schemeClr>
+          </a:lnRef>
+          <a:fillRef idx="1">
+            <a:schemeClr val="accent1"/>
+          </a:fillRef>
+          <a:effectRef idx="0">
+            <a:schemeClr val="accent1"/>
+          </a:effectRef>
+          <a:fontRef idx="minor">
+            <a:schemeClr val="lt1"/>
+          </a:fontRef>
+        </p:style>
+        <p:txBody>
+          <a:bodyPr rtlCol="0" anchor="ctr"/>
+          <a:lstStyle/>
+          <a:p>
+            <a:r>
+              <a:rPr lang="en-US" b="1" dirty="0" err="1" smtClean="0">
+                <a:solidFill>
+                  <a:srgbClr val="92D050"/>
+                </a:solidFill>
+                <a:latin typeface="Arial" pitchFamily="34" charset="0"/>
+                <a:cs typeface="Arial" pitchFamily="34" charset="0"/>
+              </a:rPr>
+              <a:t>git</a:t>
+            </a:r>
+            <a:r>
+              <a:rPr lang="en-US" b="1" dirty="0" smtClean="0">
+                <a:solidFill>
+                  <a:srgbClr val="92D050"/>
+                </a:solidFill>
+                <a:latin typeface="Arial" pitchFamily="34" charset="0"/>
+                <a:cs typeface="Arial" pitchFamily="34" charset="0"/>
+              </a:rPr>
+              <a:t>  tag</a:t>
+            </a:r>
+            <a:endParaRPr lang="en-US" b="1" dirty="0">
+              <a:solidFill>
+                <a:schemeClr val="bg1"/>
+              </a:solidFill>
+              <a:latin typeface="Arial" pitchFamily="34" charset="0"/>
+              <a:cs typeface="Arial" pitchFamily="34" charset="0"/>
+            </a:endParaRPr>
+          </a:p>
+        </p:txBody>
+      </p:sp>
+      <p:sp>
+        <p:nvSpPr>
+          <p:cNvPr id="5" name="Rectangle 4"/>
+          <p:cNvSpPr/>
+          <p:nvPr/>
+        </p:nvSpPr>
+        <p:spPr>
+          <a:xfrm flipH="1">
+            <a:off x="3203848" y="2780928"/>
+            <a:ext cx="3168352" cy="360040"/>
+          </a:xfrm>
+          <a:prstGeom prst="rect">
+            <a:avLst/>
+          </a:prstGeom>
+          <a:solidFill>
+            <a:schemeClr val="tx1"/>
+          </a:solidFill>
+          <a:ln>
+            <a:noFill/>
+          </a:ln>
+        </p:spPr>
+        <p:style>
+          <a:lnRef idx="2">
+            <a:schemeClr val="accent1">
+              <a:shade val="50000"/>
+            </a:schemeClr>
+          </a:lnRef>
+          <a:fillRef idx="1">
+            <a:schemeClr val="accent1"/>
+          </a:fillRef>
+          <a:effectRef idx="0">
+            <a:schemeClr val="accent1"/>
+          </a:effectRef>
+          <a:fontRef idx="minor">
+            <a:schemeClr val="lt1"/>
+          </a:fontRef>
+        </p:style>
+        <p:txBody>
+          <a:bodyPr rtlCol="0" anchor="ctr"/>
+          <a:lstStyle/>
+          <a:p>
+            <a:r>
+              <a:rPr lang="en-US" b="1" dirty="0" err="1" smtClean="0">
+                <a:solidFill>
+                  <a:srgbClr val="92D050"/>
+                </a:solidFill>
+                <a:latin typeface="Arial" pitchFamily="34" charset="0"/>
+                <a:cs typeface="Arial" pitchFamily="34" charset="0"/>
+              </a:rPr>
+              <a:t>git</a:t>
+            </a:r>
+            <a:r>
+              <a:rPr lang="en-US" b="1" dirty="0" smtClean="0">
+                <a:solidFill>
+                  <a:srgbClr val="92D050"/>
+                </a:solidFill>
+                <a:latin typeface="Arial" pitchFamily="34" charset="0"/>
+                <a:cs typeface="Arial" pitchFamily="34" charset="0"/>
+              </a:rPr>
+              <a:t>  tag  -l  </a:t>
+            </a:r>
+            <a:r>
+              <a:rPr lang="en-US" b="1" dirty="0" smtClean="0">
+                <a:solidFill>
+                  <a:schemeClr val="bg1"/>
+                </a:solidFill>
+                <a:latin typeface="Arial" pitchFamily="34" charset="0"/>
+                <a:cs typeface="Arial" pitchFamily="34" charset="0"/>
+              </a:rPr>
+              <a:t>&lt;search criteria&gt;</a:t>
+            </a:r>
+            <a:endParaRPr lang="en-US" b="1" dirty="0">
+              <a:solidFill>
+                <a:schemeClr val="bg1"/>
+              </a:solidFill>
+              <a:latin typeface="Arial" pitchFamily="34" charset="0"/>
+              <a:cs typeface="Arial" pitchFamily="34" charset="0"/>
+            </a:endParaRPr>
+          </a:p>
+        </p:txBody>
+      </p:sp>
+      <p:sp>
+        <p:nvSpPr>
+          <p:cNvPr id="6" name="Rectangle 5"/>
+          <p:cNvSpPr/>
+          <p:nvPr/>
+        </p:nvSpPr>
+        <p:spPr>
+          <a:xfrm flipH="1">
+            <a:off x="539552" y="4869160"/>
+            <a:ext cx="1800200" cy="360040"/>
+          </a:xfrm>
+          <a:prstGeom prst="rect">
+            <a:avLst/>
+          </a:prstGeom>
+          <a:solidFill>
+            <a:schemeClr val="tx1"/>
+          </a:solidFill>
+          <a:ln>
+            <a:noFill/>
+          </a:ln>
+        </p:spPr>
+        <p:style>
+          <a:lnRef idx="2">
+            <a:schemeClr val="accent1">
+              <a:shade val="50000"/>
+            </a:schemeClr>
+          </a:lnRef>
+          <a:fillRef idx="1">
+            <a:schemeClr val="accent1"/>
+          </a:fillRef>
+          <a:effectRef idx="0">
+            <a:schemeClr val="accent1"/>
+          </a:effectRef>
+          <a:fontRef idx="minor">
+            <a:schemeClr val="lt1"/>
+          </a:fontRef>
+        </p:style>
+        <p:txBody>
+          <a:bodyPr rtlCol="0" anchor="ctr"/>
+          <a:lstStyle/>
+          <a:p>
+            <a:r>
+              <a:rPr lang="en-US" b="1" dirty="0" err="1" smtClean="0">
+                <a:solidFill>
+                  <a:srgbClr val="92D050"/>
+                </a:solidFill>
+                <a:latin typeface="Arial" pitchFamily="34" charset="0"/>
+                <a:cs typeface="Arial" pitchFamily="34" charset="0"/>
+              </a:rPr>
+              <a:t>git</a:t>
+            </a:r>
+            <a:r>
+              <a:rPr lang="en-US" b="1" dirty="0" smtClean="0">
+                <a:solidFill>
+                  <a:srgbClr val="92D050"/>
+                </a:solidFill>
+                <a:latin typeface="Arial" pitchFamily="34" charset="0"/>
+                <a:cs typeface="Arial" pitchFamily="34" charset="0"/>
+              </a:rPr>
+              <a:t>  tag  -l  "a*"</a:t>
+            </a:r>
+            <a:endParaRPr lang="en-US" b="1" dirty="0">
+              <a:solidFill>
+                <a:srgbClr val="92D050"/>
+              </a:solidFill>
+              <a:latin typeface="Arial" pitchFamily="34" charset="0"/>
+              <a:cs typeface="Arial" pitchFamily="34" charset="0"/>
+            </a:endParaRPr>
+          </a:p>
+        </p:txBody>
+      </p:sp>
+      <p:sp>
+        <p:nvSpPr>
+          <p:cNvPr id="7" name="Rectangle 6"/>
+          <p:cNvSpPr/>
+          <p:nvPr/>
+        </p:nvSpPr>
+        <p:spPr>
+          <a:xfrm flipH="1">
+            <a:off x="2240034" y="5315063"/>
+            <a:ext cx="1800200" cy="360040"/>
+          </a:xfrm>
+          <a:prstGeom prst="rect">
+            <a:avLst/>
+          </a:prstGeom>
+          <a:solidFill>
+            <a:schemeClr val="tx1"/>
+          </a:solidFill>
+          <a:ln>
+            <a:noFill/>
+          </a:ln>
+        </p:spPr>
+        <p:style>
+          <a:lnRef idx="2">
+            <a:schemeClr val="accent1">
+              <a:shade val="50000"/>
+            </a:schemeClr>
+          </a:lnRef>
+          <a:fillRef idx="1">
+            <a:schemeClr val="accent1"/>
+          </a:fillRef>
+          <a:effectRef idx="0">
+            <a:schemeClr val="accent1"/>
+          </a:effectRef>
+          <a:fontRef idx="minor">
+            <a:schemeClr val="lt1"/>
+          </a:fontRef>
+        </p:style>
+        <p:txBody>
+          <a:bodyPr rtlCol="0" anchor="ctr"/>
+          <a:lstStyle/>
+          <a:p>
+            <a:r>
+              <a:rPr lang="en-US" b="1" dirty="0" err="1" smtClean="0">
+                <a:solidFill>
+                  <a:srgbClr val="92D050"/>
+                </a:solidFill>
+                <a:latin typeface="Arial" pitchFamily="34" charset="0"/>
+                <a:cs typeface="Arial" pitchFamily="34" charset="0"/>
+              </a:rPr>
+              <a:t>git</a:t>
+            </a:r>
+            <a:r>
+              <a:rPr lang="en-US" b="1" dirty="0" smtClean="0">
+                <a:solidFill>
+                  <a:srgbClr val="92D050"/>
+                </a:solidFill>
+                <a:latin typeface="Arial" pitchFamily="34" charset="0"/>
+                <a:cs typeface="Arial" pitchFamily="34" charset="0"/>
+              </a:rPr>
+              <a:t>  tag  -l  "*c"</a:t>
+            </a:r>
+            <a:endParaRPr lang="en-US" b="1" dirty="0">
+              <a:solidFill>
+                <a:srgbClr val="92D050"/>
+              </a:solidFill>
+              <a:latin typeface="Arial" pitchFamily="34" charset="0"/>
+              <a:cs typeface="Arial" pitchFamily="34" charset="0"/>
+            </a:endParaRPr>
+          </a:p>
+        </p:txBody>
+      </p:sp>
+    </p:spTree>
+    <p:extLst>
+      <p:ext uri="{BB962C8B-B14F-4D97-AF65-F5344CB8AC3E}">
+        <p14:creationId xmlns:p14="http://schemas.microsoft.com/office/powerpoint/2010/main" val="3682459328"/>
       </p:ext>
     </p:extLst>
   </p:cSld>

</xml_diff>

<commit_message>
CRUD for Tags complete
</commit_message>
<xml_diff>
--- a/Tags and Versioning.pptx
+++ b/Tags and Versioning.pptx
@@ -10,6 +10,8 @@
     <p:sldId id="258" r:id="rId4"/>
     <p:sldId id="260" r:id="rId5"/>
     <p:sldId id="259" r:id="rId6"/>
+    <p:sldId id="262" r:id="rId7"/>
+    <p:sldId id="261" r:id="rId8"/>
   </p:sldIdLst>
   <p:sldSz cx="9144000" cy="6858000" type="screen4x3"/>
   <p:notesSz cx="6858000" cy="9144000"/>
@@ -3365,11 +3367,7 @@
             </a:pPr>
             <a:r>
               <a:rPr lang="en-US" dirty="0" smtClean="0"/>
-              <a:t>Replace </a:t>
-            </a:r>
-            <a:r>
-              <a:rPr lang="en-US" dirty="0" smtClean="0"/>
-              <a:t>the &lt;tag name&gt; with a tag name of your choice (usually a version number) and </a:t>
+              <a:t>Replace the &lt;tag name&gt; with a tag name of your choice (usually a version number) and </a:t>
             </a:r>
             <a:r>
               <a:rPr lang="en-US" dirty="0"/>
@@ -3563,9 +3561,16 @@
             <p:ph idx="1"/>
           </p:nvPr>
         </p:nvSpPr>
-        <p:spPr/>
-        <p:txBody>
-          <a:bodyPr/>
+        <p:spPr>
+          <a:xfrm>
+            <a:off x="457200" y="1600200"/>
+            <a:ext cx="8229600" cy="4781128"/>
+          </a:xfrm>
+        </p:spPr>
+        <p:txBody>
+          <a:bodyPr>
+            <a:normAutofit/>
+          </a:bodyPr>
           <a:lstStyle/>
           <a:p>
             <a:pPr marL="0" indent="0">
@@ -3588,8 +3593,37 @@
             </a:pPr>
             <a:r>
               <a:rPr lang="en-US" dirty="0" smtClean="0"/>
-              <a:t>Just make sure you have find the right commit you wish to tag, and take note of it's checksum.</a:t>
-            </a:r>
+              <a:t>Just make sure you have find the right commit you wish to tag, and take note of </a:t>
+            </a:r>
+            <a:r>
+              <a:rPr lang="en-US" dirty="0" smtClean="0"/>
+              <a:t>its </a:t>
+            </a:r>
+            <a:r>
+              <a:rPr lang="en-US" dirty="0" smtClean="0"/>
+              <a:t>checksum</a:t>
+            </a:r>
+            <a:r>
+              <a:rPr lang="en-US" dirty="0" smtClean="0"/>
+              <a:t>. Do note that this </a:t>
+            </a:r>
+            <a:r>
+              <a:rPr lang="en-US" b="1" dirty="0" smtClean="0"/>
+              <a:t>only works properly</a:t>
+            </a:r>
+            <a:r>
+              <a:rPr lang="en-US" dirty="0" smtClean="0"/>
+              <a:t> if you tag an </a:t>
+            </a:r>
+            <a:r>
+              <a:rPr lang="en-US" b="1" dirty="0" smtClean="0"/>
+              <a:t>untagged commit</a:t>
+            </a:r>
+            <a:r>
+              <a:rPr lang="en-US" dirty="0" smtClean="0"/>
+              <a:t>. There are security reasons for this, and we will show you the proper way to update the tag name and message a few pages later.</a:t>
+            </a:r>
+            <a:endParaRPr lang="en-US" dirty="0" smtClean="0"/>
           </a:p>
           <a:p>
             <a:pPr marL="0" indent="0">
@@ -3775,12 +3809,14 @@
         </p:nvSpPr>
         <p:spPr>
           <a:xfrm>
-            <a:off x="457200" y="1600200"/>
+            <a:off x="457200" y="1384176"/>
             <a:ext cx="8229600" cy="4925144"/>
           </a:xfrm>
         </p:spPr>
         <p:txBody>
-          <a:bodyPr/>
+          <a:bodyPr>
+            <a:normAutofit lnSpcReduction="10000"/>
+          </a:bodyPr>
           <a:lstStyle/>
           <a:p>
             <a:pPr marL="0" indent="0">
@@ -3829,8 +3865,26 @@
             </a:br>
             <a:r>
               <a:rPr lang="en-US" dirty="0" smtClean="0"/>
-              <a:t>		will find all the tags starting with "a". Similarly, 			will find everything ending in a "c".</a:t>
-            </a:r>
+              <a:t>		will find all the tags starting with "a". Similarly, 			will find everything ending in a "c</a:t>
+            </a:r>
+            <a:r>
+              <a:rPr lang="en-US" dirty="0" smtClean="0"/>
+              <a:t>".</a:t>
+            </a:r>
+          </a:p>
+          <a:p>
+            <a:pPr marL="0" indent="0">
+              <a:buNone/>
+            </a:pPr>
+            <a:r>
+              <a:rPr lang="en-US" dirty="0"/>
+              <a:t>If you want to see a specific tag, you can use:</a:t>
+            </a:r>
+          </a:p>
+          <a:p>
+            <a:pPr marL="0" indent="0">
+              <a:buNone/>
+            </a:pPr>
             <a:endParaRPr lang="en-SG" dirty="0"/>
           </a:p>
         </p:txBody>
@@ -3843,7 +3897,7 @@
         </p:nvSpPr>
         <p:spPr>
           <a:xfrm flipH="1">
-            <a:off x="827584" y="2780928"/>
+            <a:off x="827584" y="2420888"/>
             <a:ext cx="1008112" cy="360040"/>
           </a:xfrm>
           <a:prstGeom prst="rect">
@@ -3914,7 +3968,7 @@
         </p:nvSpPr>
         <p:spPr>
           <a:xfrm flipH="1">
-            <a:off x="3203848" y="2780928"/>
+            <a:off x="3203848" y="2420888"/>
             <a:ext cx="3168352" cy="360040"/>
           </a:xfrm>
           <a:prstGeom prst="rect">
@@ -3995,7 +4049,7 @@
         </p:nvSpPr>
         <p:spPr>
           <a:xfrm flipH="1">
-            <a:off x="539552" y="4869160"/>
+            <a:off x="539552" y="4293096"/>
             <a:ext cx="1800200" cy="360040"/>
           </a:xfrm>
           <a:prstGeom prst="rect">
@@ -4066,7 +4120,7 @@
         </p:nvSpPr>
         <p:spPr>
           <a:xfrm flipH="1">
-            <a:off x="2240034" y="5315063"/>
+            <a:off x="2240034" y="4738999"/>
             <a:ext cx="1800200" cy="360040"/>
           </a:xfrm>
           <a:prstGeom prst="rect">
@@ -4129,10 +4183,567 @@
           </a:p>
         </p:txBody>
       </p:sp>
+      <p:sp>
+        <p:nvSpPr>
+          <p:cNvPr id="8" name="Rectangle 7"/>
+          <p:cNvSpPr/>
+          <p:nvPr/>
+        </p:nvSpPr>
+        <p:spPr>
+          <a:xfrm flipH="1">
+            <a:off x="539552" y="6165304"/>
+            <a:ext cx="2664296" cy="360040"/>
+          </a:xfrm>
+          <a:prstGeom prst="rect">
+            <a:avLst/>
+          </a:prstGeom>
+          <a:solidFill>
+            <a:schemeClr val="tx1"/>
+          </a:solidFill>
+          <a:ln>
+            <a:noFill/>
+          </a:ln>
+        </p:spPr>
+        <p:style>
+          <a:lnRef idx="2">
+            <a:schemeClr val="accent1">
+              <a:shade val="50000"/>
+            </a:schemeClr>
+          </a:lnRef>
+          <a:fillRef idx="1">
+            <a:schemeClr val="accent1"/>
+          </a:fillRef>
+          <a:effectRef idx="0">
+            <a:schemeClr val="accent1"/>
+          </a:effectRef>
+          <a:fontRef idx="minor">
+            <a:schemeClr val="lt1"/>
+          </a:fontRef>
+        </p:style>
+        <p:txBody>
+          <a:bodyPr rtlCol="0" anchor="ctr"/>
+          <a:lstStyle/>
+          <a:p>
+            <a:r>
+              <a:rPr lang="en-US" b="1" dirty="0" err="1" smtClean="0">
+                <a:solidFill>
+                  <a:srgbClr val="92D050"/>
+                </a:solidFill>
+                <a:latin typeface="Arial" pitchFamily="34" charset="0"/>
+                <a:cs typeface="Arial" pitchFamily="34" charset="0"/>
+              </a:rPr>
+              <a:t>git</a:t>
+            </a:r>
+            <a:r>
+              <a:rPr lang="en-US" b="1" dirty="0" smtClean="0">
+                <a:solidFill>
+                  <a:srgbClr val="92D050"/>
+                </a:solidFill>
+                <a:latin typeface="Arial" pitchFamily="34" charset="0"/>
+                <a:cs typeface="Arial" pitchFamily="34" charset="0"/>
+              </a:rPr>
+              <a:t>  </a:t>
+            </a:r>
+            <a:r>
+              <a:rPr lang="en-US" b="1" dirty="0" smtClean="0">
+                <a:solidFill>
+                  <a:srgbClr val="92D050"/>
+                </a:solidFill>
+                <a:latin typeface="Arial" pitchFamily="34" charset="0"/>
+                <a:cs typeface="Arial" pitchFamily="34" charset="0"/>
+              </a:rPr>
+              <a:t>show </a:t>
+            </a:r>
+            <a:r>
+              <a:rPr lang="en-US" b="1" dirty="0" smtClean="0">
+                <a:solidFill>
+                  <a:schemeClr val="bg1"/>
+                </a:solidFill>
+                <a:latin typeface="Arial" pitchFamily="34" charset="0"/>
+                <a:cs typeface="Arial" pitchFamily="34" charset="0"/>
+              </a:rPr>
+              <a:t>&lt;tag name&gt;</a:t>
+            </a:r>
+            <a:endParaRPr lang="en-US" b="1" dirty="0">
+              <a:solidFill>
+                <a:schemeClr val="bg1"/>
+              </a:solidFill>
+              <a:latin typeface="Arial" pitchFamily="34" charset="0"/>
+              <a:cs typeface="Arial" pitchFamily="34" charset="0"/>
+            </a:endParaRPr>
+          </a:p>
+        </p:txBody>
+      </p:sp>
     </p:spTree>
     <p:extLst>
       <p:ext uri="{BB962C8B-B14F-4D97-AF65-F5344CB8AC3E}">
         <p14:creationId xmlns:p14="http://schemas.microsoft.com/office/powerpoint/2010/main" val="3682459328"/>
+      </p:ext>
+    </p:extLst>
+  </p:cSld>
+  <p:clrMapOvr>
+    <a:masterClrMapping/>
+  </p:clrMapOvr>
+  <p:timing>
+    <p:tnLst>
+      <p:par>
+        <p:cTn id="1" dur="indefinite" restart="never" nodeType="tmRoot"/>
+      </p:par>
+    </p:tnLst>
+  </p:timing>
+</p:sld>
+</file>
+
+<file path=ppt/slides/slide6.xml><?xml version="1.0" encoding="utf-8"?>
+<p:sld xmlns:a="http://schemas.openxmlformats.org/drawingml/2006/main" xmlns:r="http://schemas.openxmlformats.org/officeDocument/2006/relationships" xmlns:p="http://schemas.openxmlformats.org/presentationml/2006/main">
+  <p:cSld>
+    <p:spTree>
+      <p:nvGrpSpPr>
+        <p:cNvPr id="1" name=""/>
+        <p:cNvGrpSpPr/>
+        <p:nvPr/>
+      </p:nvGrpSpPr>
+      <p:grpSpPr>
+        <a:xfrm>
+          <a:off x="0" y="0"/>
+          <a:ext cx="0" cy="0"/>
+          <a:chOff x="0" y="0"/>
+          <a:chExt cx="0" cy="0"/>
+        </a:xfrm>
+      </p:grpSpPr>
+      <p:sp>
+        <p:nvSpPr>
+          <p:cNvPr id="2" name="Title 1"/>
+          <p:cNvSpPr>
+            <a:spLocks noGrp="1"/>
+          </p:cNvSpPr>
+          <p:nvPr>
+            <p:ph type="title"/>
+          </p:nvPr>
+        </p:nvSpPr>
+        <p:spPr/>
+        <p:txBody>
+          <a:bodyPr/>
+          <a:lstStyle/>
+          <a:p>
+            <a:r>
+              <a:rPr lang="en-US" dirty="0" smtClean="0"/>
+              <a:t>Tags</a:t>
+            </a:r>
+            <a:endParaRPr lang="en-SG" dirty="0"/>
+          </a:p>
+        </p:txBody>
+      </p:sp>
+      <p:sp>
+        <p:nvSpPr>
+          <p:cNvPr id="3" name="Content Placeholder 2"/>
+          <p:cNvSpPr>
+            <a:spLocks noGrp="1"/>
+          </p:cNvSpPr>
+          <p:nvPr>
+            <p:ph idx="1"/>
+          </p:nvPr>
+        </p:nvSpPr>
+        <p:spPr>
+          <a:xfrm>
+            <a:off x="457200" y="1600200"/>
+            <a:ext cx="8229600" cy="4997152"/>
+          </a:xfrm>
+        </p:spPr>
+        <p:txBody>
+          <a:bodyPr>
+            <a:normAutofit/>
+          </a:bodyPr>
+          <a:lstStyle/>
+          <a:p>
+            <a:pPr marL="0" indent="0">
+              <a:buNone/>
+            </a:pPr>
+            <a:r>
+              <a:rPr lang="en-US" dirty="0" smtClean="0"/>
+              <a:t>If you want to edit a tag, this is going to be a little tricky. You can delete the old tag and re-create it, but that can be a little messy having to remember the message and tag name.</a:t>
+            </a:r>
+            <a:r>
+              <a:rPr lang="en-SG" dirty="0" smtClean="0"/>
+              <a:t> Or you can do this:</a:t>
+            </a:r>
+          </a:p>
+          <a:p>
+            <a:pPr marL="0" indent="0">
+              <a:buNone/>
+            </a:pPr>
+            <a:r>
+              <a:rPr lang="en-US" dirty="0" smtClean="0"/>
+              <a:t>This will open up an editor with your old tag message. </a:t>
+            </a:r>
+            <a:r>
+              <a:rPr lang="en-US" dirty="0" err="1" smtClean="0"/>
+              <a:t>Git</a:t>
+            </a:r>
+            <a:r>
+              <a:rPr lang="en-US" dirty="0" smtClean="0"/>
+              <a:t> overwrites the old tag name with the new one, so if you put the same for both, then only your message will be updated.</a:t>
+            </a:r>
+            <a:endParaRPr lang="en-SG" dirty="0" smtClean="0"/>
+          </a:p>
+        </p:txBody>
+      </p:sp>
+      <p:sp>
+        <p:nvSpPr>
+          <p:cNvPr id="4" name="Rectangle 3"/>
+          <p:cNvSpPr/>
+          <p:nvPr/>
+        </p:nvSpPr>
+        <p:spPr>
+          <a:xfrm flipH="1">
+            <a:off x="2555776" y="3645024"/>
+            <a:ext cx="5328592" cy="360040"/>
+          </a:xfrm>
+          <a:prstGeom prst="rect">
+            <a:avLst/>
+          </a:prstGeom>
+          <a:solidFill>
+            <a:schemeClr val="tx1"/>
+          </a:solidFill>
+          <a:ln>
+            <a:noFill/>
+          </a:ln>
+        </p:spPr>
+        <p:style>
+          <a:lnRef idx="2">
+            <a:schemeClr val="accent1">
+              <a:shade val="50000"/>
+            </a:schemeClr>
+          </a:lnRef>
+          <a:fillRef idx="1">
+            <a:schemeClr val="accent1"/>
+          </a:fillRef>
+          <a:effectRef idx="0">
+            <a:schemeClr val="accent1"/>
+          </a:effectRef>
+          <a:fontRef idx="minor">
+            <a:schemeClr val="lt1"/>
+          </a:fontRef>
+        </p:style>
+        <p:txBody>
+          <a:bodyPr rtlCol="0" anchor="ctr"/>
+          <a:lstStyle/>
+          <a:p>
+            <a:r>
+              <a:rPr lang="en-SG" b="1" dirty="0">
+                <a:solidFill>
+                  <a:srgbClr val="00B050"/>
+                </a:solidFill>
+                <a:latin typeface="Arial" pitchFamily="34" charset="0"/>
+                <a:cs typeface="Arial" pitchFamily="34" charset="0"/>
+              </a:rPr>
+              <a:t>git </a:t>
+            </a:r>
+            <a:r>
+              <a:rPr lang="en-SG" b="1" dirty="0" smtClean="0">
+                <a:solidFill>
+                  <a:srgbClr val="00B050"/>
+                </a:solidFill>
+                <a:latin typeface="Arial" pitchFamily="34" charset="0"/>
+                <a:cs typeface="Arial" pitchFamily="34" charset="0"/>
+              </a:rPr>
+              <a:t> tag  </a:t>
+            </a:r>
+            <a:r>
+              <a:rPr lang="en-SG" b="1" dirty="0" smtClean="0">
+                <a:solidFill>
+                  <a:schemeClr val="bg1"/>
+                </a:solidFill>
+                <a:latin typeface="Arial" pitchFamily="34" charset="0"/>
+                <a:cs typeface="Arial" pitchFamily="34" charset="0"/>
+              </a:rPr>
+              <a:t>&lt;</a:t>
+            </a:r>
+            <a:r>
+              <a:rPr lang="en-SG" b="1" dirty="0">
+                <a:solidFill>
+                  <a:schemeClr val="bg1"/>
+                </a:solidFill>
+                <a:latin typeface="Arial" pitchFamily="34" charset="0"/>
+                <a:cs typeface="Arial" pitchFamily="34" charset="0"/>
+              </a:rPr>
+              <a:t>old tag name&gt; </a:t>
+            </a:r>
+            <a:r>
+              <a:rPr lang="en-SG" b="1" dirty="0" smtClean="0">
+                <a:solidFill>
+                  <a:schemeClr val="bg1"/>
+                </a:solidFill>
+                <a:latin typeface="Arial" pitchFamily="34" charset="0"/>
+                <a:cs typeface="Arial" pitchFamily="34" charset="0"/>
+              </a:rPr>
+              <a:t> &lt;</a:t>
+            </a:r>
+            <a:r>
+              <a:rPr lang="en-SG" b="1" dirty="0">
+                <a:solidFill>
+                  <a:schemeClr val="bg1"/>
+                </a:solidFill>
+                <a:latin typeface="Arial" pitchFamily="34" charset="0"/>
+                <a:cs typeface="Arial" pitchFamily="34" charset="0"/>
+              </a:rPr>
+              <a:t>new tag name</a:t>
+            </a:r>
+            <a:r>
+              <a:rPr lang="en-SG" b="1" dirty="0" smtClean="0">
+                <a:solidFill>
+                  <a:schemeClr val="bg1"/>
+                </a:solidFill>
+                <a:latin typeface="Arial" pitchFamily="34" charset="0"/>
+                <a:cs typeface="Arial" pitchFamily="34" charset="0"/>
+              </a:rPr>
+              <a:t>&gt; </a:t>
+            </a:r>
+            <a:r>
+              <a:rPr lang="en-SG" b="1" dirty="0" smtClean="0">
+                <a:solidFill>
+                  <a:srgbClr val="00B050"/>
+                </a:solidFill>
+                <a:latin typeface="Arial" pitchFamily="34" charset="0"/>
+                <a:cs typeface="Arial" pitchFamily="34" charset="0"/>
+              </a:rPr>
+              <a:t> </a:t>
+            </a:r>
+            <a:r>
+              <a:rPr lang="en-SG" b="1" dirty="0">
+                <a:solidFill>
+                  <a:srgbClr val="00B050"/>
+                </a:solidFill>
+                <a:latin typeface="Arial" pitchFamily="34" charset="0"/>
+                <a:cs typeface="Arial" pitchFamily="34" charset="0"/>
+              </a:rPr>
+              <a:t>-f </a:t>
+            </a:r>
+            <a:r>
+              <a:rPr lang="en-SG" b="1" dirty="0" smtClean="0">
+                <a:solidFill>
+                  <a:srgbClr val="00B050"/>
+                </a:solidFill>
+                <a:latin typeface="Arial" pitchFamily="34" charset="0"/>
+                <a:cs typeface="Arial" pitchFamily="34" charset="0"/>
+              </a:rPr>
+              <a:t> -</a:t>
+            </a:r>
+            <a:r>
+              <a:rPr lang="en-SG" b="1" dirty="0">
+                <a:solidFill>
+                  <a:srgbClr val="00B050"/>
+                </a:solidFill>
+                <a:latin typeface="Arial" pitchFamily="34" charset="0"/>
+                <a:cs typeface="Arial" pitchFamily="34" charset="0"/>
+              </a:rPr>
+              <a:t>a</a:t>
+            </a:r>
+            <a:endParaRPr lang="en-US" b="1" dirty="0">
+              <a:solidFill>
+                <a:srgbClr val="00B050"/>
+              </a:solidFill>
+              <a:latin typeface="Arial" pitchFamily="34" charset="0"/>
+              <a:cs typeface="Arial" pitchFamily="34" charset="0"/>
+            </a:endParaRPr>
+          </a:p>
+        </p:txBody>
+      </p:sp>
+    </p:spTree>
+    <p:extLst>
+      <p:ext uri="{BB962C8B-B14F-4D97-AF65-F5344CB8AC3E}">
+        <p14:creationId xmlns:p14="http://schemas.microsoft.com/office/powerpoint/2010/main" val="1078044404"/>
+      </p:ext>
+    </p:extLst>
+  </p:cSld>
+  <p:clrMapOvr>
+    <a:masterClrMapping/>
+  </p:clrMapOvr>
+  <p:timing>
+    <p:tnLst>
+      <p:par>
+        <p:cTn id="1" dur="indefinite" restart="never" nodeType="tmRoot"/>
+      </p:par>
+    </p:tnLst>
+  </p:timing>
+</p:sld>
+</file>
+
+<file path=ppt/slides/slide7.xml><?xml version="1.0" encoding="utf-8"?>
+<p:sld xmlns:a="http://schemas.openxmlformats.org/drawingml/2006/main" xmlns:r="http://schemas.openxmlformats.org/officeDocument/2006/relationships" xmlns:p="http://schemas.openxmlformats.org/presentationml/2006/main">
+  <p:cSld>
+    <p:spTree>
+      <p:nvGrpSpPr>
+        <p:cNvPr id="1" name=""/>
+        <p:cNvGrpSpPr/>
+        <p:nvPr/>
+      </p:nvGrpSpPr>
+      <p:grpSpPr>
+        <a:xfrm>
+          <a:off x="0" y="0"/>
+          <a:ext cx="0" cy="0"/>
+          <a:chOff x="0" y="0"/>
+          <a:chExt cx="0" cy="0"/>
+        </a:xfrm>
+      </p:grpSpPr>
+      <p:sp>
+        <p:nvSpPr>
+          <p:cNvPr id="2" name="Title 1"/>
+          <p:cNvSpPr>
+            <a:spLocks noGrp="1"/>
+          </p:cNvSpPr>
+          <p:nvPr>
+            <p:ph type="title"/>
+          </p:nvPr>
+        </p:nvSpPr>
+        <p:spPr/>
+        <p:txBody>
+          <a:bodyPr/>
+          <a:lstStyle/>
+          <a:p>
+            <a:r>
+              <a:rPr lang="en-US" dirty="0" smtClean="0"/>
+              <a:t>Tags</a:t>
+            </a:r>
+            <a:endParaRPr lang="en-SG" dirty="0"/>
+          </a:p>
+        </p:txBody>
+      </p:sp>
+      <p:sp>
+        <p:nvSpPr>
+          <p:cNvPr id="3" name="Content Placeholder 2"/>
+          <p:cNvSpPr>
+            <a:spLocks noGrp="1"/>
+          </p:cNvSpPr>
+          <p:nvPr>
+            <p:ph idx="1"/>
+          </p:nvPr>
+        </p:nvSpPr>
+        <p:spPr/>
+        <p:txBody>
+          <a:bodyPr/>
+          <a:lstStyle/>
+          <a:p>
+            <a:pPr marL="0" indent="0">
+              <a:buNone/>
+            </a:pPr>
+            <a:r>
+              <a:rPr lang="en-US" dirty="0" smtClean="0"/>
+              <a:t>If you want to delete a tag for some reason, you can always do so anytime with:</a:t>
+            </a:r>
+          </a:p>
+          <a:p>
+            <a:pPr marL="0" indent="0">
+              <a:buNone/>
+            </a:pPr>
+            <a:endParaRPr lang="en-US" dirty="0" smtClean="0"/>
+          </a:p>
+          <a:p>
+            <a:pPr marL="0" indent="0">
+              <a:buNone/>
+            </a:pPr>
+            <a:r>
+              <a:rPr lang="en-US" dirty="0" smtClean="0"/>
+              <a:t>Clean and simple.</a:t>
+            </a:r>
+          </a:p>
+        </p:txBody>
+      </p:sp>
+      <p:sp>
+        <p:nvSpPr>
+          <p:cNvPr id="4" name="Rectangle 3"/>
+          <p:cNvSpPr/>
+          <p:nvPr/>
+        </p:nvSpPr>
+        <p:spPr>
+          <a:xfrm flipH="1">
+            <a:off x="827584" y="2780928"/>
+            <a:ext cx="2808312" cy="360040"/>
+          </a:xfrm>
+          <a:prstGeom prst="rect">
+            <a:avLst/>
+          </a:prstGeom>
+          <a:solidFill>
+            <a:schemeClr val="tx1"/>
+          </a:solidFill>
+          <a:ln>
+            <a:noFill/>
+          </a:ln>
+        </p:spPr>
+        <p:style>
+          <a:lnRef idx="2">
+            <a:schemeClr val="accent1">
+              <a:shade val="50000"/>
+            </a:schemeClr>
+          </a:lnRef>
+          <a:fillRef idx="1">
+            <a:schemeClr val="accent1"/>
+          </a:fillRef>
+          <a:effectRef idx="0">
+            <a:schemeClr val="accent1"/>
+          </a:effectRef>
+          <a:fontRef idx="minor">
+            <a:schemeClr val="lt1"/>
+          </a:fontRef>
+        </p:style>
+        <p:txBody>
+          <a:bodyPr rtlCol="0" anchor="ctr"/>
+          <a:lstStyle/>
+          <a:p>
+            <a:r>
+              <a:rPr lang="en-US" b="1" dirty="0" err="1" smtClean="0">
+                <a:solidFill>
+                  <a:srgbClr val="92D050"/>
+                </a:solidFill>
+                <a:latin typeface="Arial" pitchFamily="34" charset="0"/>
+                <a:cs typeface="Arial" pitchFamily="34" charset="0"/>
+              </a:rPr>
+              <a:t>git</a:t>
+            </a:r>
+            <a:r>
+              <a:rPr lang="en-US" b="1" dirty="0" smtClean="0">
+                <a:solidFill>
+                  <a:srgbClr val="92D050"/>
+                </a:solidFill>
+                <a:latin typeface="Arial" pitchFamily="34" charset="0"/>
+                <a:cs typeface="Arial" pitchFamily="34" charset="0"/>
+              </a:rPr>
+              <a:t>  </a:t>
+            </a:r>
+            <a:r>
+              <a:rPr lang="en-US" b="1" dirty="0" smtClean="0">
+                <a:solidFill>
+                  <a:srgbClr val="92D050"/>
+                </a:solidFill>
+                <a:latin typeface="Arial" pitchFamily="34" charset="0"/>
+                <a:cs typeface="Arial" pitchFamily="34" charset="0"/>
+              </a:rPr>
+              <a:t>tag  -d  </a:t>
+            </a:r>
+            <a:r>
+              <a:rPr lang="en-US" b="1" dirty="0" smtClean="0">
+                <a:solidFill>
+                  <a:schemeClr val="bg1"/>
+                </a:solidFill>
+                <a:latin typeface="Arial" pitchFamily="34" charset="0"/>
+                <a:cs typeface="Arial" pitchFamily="34" charset="0"/>
+              </a:rPr>
+              <a:t>&lt;tag name&gt;</a:t>
+            </a:r>
+            <a:endParaRPr lang="en-US" b="1" dirty="0">
+              <a:solidFill>
+                <a:schemeClr val="bg1"/>
+              </a:solidFill>
+              <a:latin typeface="Arial" pitchFamily="34" charset="0"/>
+              <a:cs typeface="Arial" pitchFamily="34" charset="0"/>
+            </a:endParaRPr>
+          </a:p>
+        </p:txBody>
+      </p:sp>
+    </p:spTree>
+    <p:extLst>
+      <p:ext uri="{BB962C8B-B14F-4D97-AF65-F5344CB8AC3E}">
+        <p14:creationId xmlns:p14="http://schemas.microsoft.com/office/powerpoint/2010/main" val="141754612"/>
       </p:ext>
     </p:extLst>
   </p:cSld>

</xml_diff>